<commit_message>
Fist exe application build, had to install VISA runtime on the target PC.  Still need to load Keyance sensors.
</commit_message>
<xml_diff>
--- a/labview xl print error..pptx
+++ b/labview xl print error..pptx
@@ -7,6 +7,7 @@
   <p:sldIdLst>
     <p:sldId id="256" r:id="rId2"/>
     <p:sldId id="257" r:id="rId3"/>
+    <p:sldId id="258" r:id="rId4"/>
   </p:sldIdLst>
   <p:sldSz cx="12192000" cy="6858000"/>
   <p:notesSz cx="6858000" cy="9144000"/>
@@ -118,7 +119,7 @@
   <pc:docChgLst>
     <pc:chgData name="rick ales" userId="a00788a1fe100dfc" providerId="LiveId" clId="{1F545B62-74DA-4771-927F-EF8EBEF73C7D}"/>
     <pc:docChg chg="undo custSel addSld modSld">
-      <pc:chgData name="rick ales" userId="a00788a1fe100dfc" providerId="LiveId" clId="{1F545B62-74DA-4771-927F-EF8EBEF73C7D}" dt="2024-06-06T19:00:34.406" v="4" actId="27636"/>
+      <pc:chgData name="rick ales" userId="a00788a1fe100dfc" providerId="LiveId" clId="{1F545B62-74DA-4771-927F-EF8EBEF73C7D}" dt="2024-06-19T14:36:04.166" v="8" actId="478"/>
       <pc:docMkLst>
         <pc:docMk/>
       </pc:docMkLst>
@@ -145,6 +146,37 @@
           </ac:spMkLst>
         </pc:spChg>
       </pc:sldChg>
+      <pc:sldChg chg="addSp delSp new mod">
+        <pc:chgData name="rick ales" userId="a00788a1fe100dfc" providerId="LiveId" clId="{1F545B62-74DA-4771-927F-EF8EBEF73C7D}" dt="2024-06-19T14:36:04.166" v="8" actId="478"/>
+        <pc:sldMkLst>
+          <pc:docMk/>
+          <pc:sldMk cId="3971728867" sldId="258"/>
+        </pc:sldMkLst>
+        <pc:spChg chg="del">
+          <ac:chgData name="rick ales" userId="a00788a1fe100dfc" providerId="LiveId" clId="{1F545B62-74DA-4771-927F-EF8EBEF73C7D}" dt="2024-06-19T14:36:04.166" v="8" actId="478"/>
+          <ac:spMkLst>
+            <pc:docMk/>
+            <pc:sldMk cId="3971728867" sldId="258"/>
+            <ac:spMk id="2" creationId="{0C6F9694-093F-93EA-EB25-F963064654AE}"/>
+          </ac:spMkLst>
+        </pc:spChg>
+        <pc:spChg chg="del">
+          <ac:chgData name="rick ales" userId="a00788a1fe100dfc" providerId="LiveId" clId="{1F545B62-74DA-4771-927F-EF8EBEF73C7D}" dt="2024-06-19T14:35:59.584" v="6" actId="478"/>
+          <ac:spMkLst>
+            <pc:docMk/>
+            <pc:sldMk cId="3971728867" sldId="258"/>
+            <ac:spMk id="3" creationId="{9E85F495-E0C6-29DD-0030-1AC1FF559E17}"/>
+          </ac:spMkLst>
+        </pc:spChg>
+        <pc:picChg chg="add">
+          <ac:chgData name="rick ales" userId="a00788a1fe100dfc" providerId="LiveId" clId="{1F545B62-74DA-4771-927F-EF8EBEF73C7D}" dt="2024-06-19T14:36:00.622" v="7" actId="22"/>
+          <ac:picMkLst>
+            <pc:docMk/>
+            <pc:sldMk cId="3971728867" sldId="258"/>
+            <ac:picMk id="5" creationId="{2AA5377A-44DD-7A36-9B51-5791A865F017}"/>
+          </ac:picMkLst>
+        </pc:picChg>
+      </pc:sldChg>
     </pc:docChg>
   </pc:docChgLst>
 </pc:chgInfo>
@@ -297,7 +329,7 @@
           <a:p>
             <a:fld id="{4807C888-88DA-4FA3-B018-2B6678809864}" type="datetimeFigureOut">
               <a:rPr lang="en-US" smtClean="0"/>
-              <a:t>6/6/2024</a:t>
+              <a:t>6/19/2024</a:t>
             </a:fld>
             <a:endParaRPr lang="en-US"/>
           </a:p>
@@ -495,7 +527,7 @@
           <a:p>
             <a:fld id="{4807C888-88DA-4FA3-B018-2B6678809864}" type="datetimeFigureOut">
               <a:rPr lang="en-US" smtClean="0"/>
-              <a:t>6/6/2024</a:t>
+              <a:t>6/19/2024</a:t>
             </a:fld>
             <a:endParaRPr lang="en-US"/>
           </a:p>
@@ -703,7 +735,7 @@
           <a:p>
             <a:fld id="{4807C888-88DA-4FA3-B018-2B6678809864}" type="datetimeFigureOut">
               <a:rPr lang="en-US" smtClean="0"/>
-              <a:t>6/6/2024</a:t>
+              <a:t>6/19/2024</a:t>
             </a:fld>
             <a:endParaRPr lang="en-US"/>
           </a:p>
@@ -901,7 +933,7 @@
           <a:p>
             <a:fld id="{4807C888-88DA-4FA3-B018-2B6678809864}" type="datetimeFigureOut">
               <a:rPr lang="en-US" smtClean="0"/>
-              <a:t>6/6/2024</a:t>
+              <a:t>6/19/2024</a:t>
             </a:fld>
             <a:endParaRPr lang="en-US"/>
           </a:p>
@@ -1176,7 +1208,7 @@
           <a:p>
             <a:fld id="{4807C888-88DA-4FA3-B018-2B6678809864}" type="datetimeFigureOut">
               <a:rPr lang="en-US" smtClean="0"/>
-              <a:t>6/6/2024</a:t>
+              <a:t>6/19/2024</a:t>
             </a:fld>
             <a:endParaRPr lang="en-US"/>
           </a:p>
@@ -1441,7 +1473,7 @@
           <a:p>
             <a:fld id="{4807C888-88DA-4FA3-B018-2B6678809864}" type="datetimeFigureOut">
               <a:rPr lang="en-US" smtClean="0"/>
-              <a:t>6/6/2024</a:t>
+              <a:t>6/19/2024</a:t>
             </a:fld>
             <a:endParaRPr lang="en-US"/>
           </a:p>
@@ -1853,7 +1885,7 @@
           <a:p>
             <a:fld id="{4807C888-88DA-4FA3-B018-2B6678809864}" type="datetimeFigureOut">
               <a:rPr lang="en-US" smtClean="0"/>
-              <a:t>6/6/2024</a:t>
+              <a:t>6/19/2024</a:t>
             </a:fld>
             <a:endParaRPr lang="en-US"/>
           </a:p>
@@ -1994,7 +2026,7 @@
           <a:p>
             <a:fld id="{4807C888-88DA-4FA3-B018-2B6678809864}" type="datetimeFigureOut">
               <a:rPr lang="en-US" smtClean="0"/>
-              <a:t>6/6/2024</a:t>
+              <a:t>6/19/2024</a:t>
             </a:fld>
             <a:endParaRPr lang="en-US"/>
           </a:p>
@@ -2107,7 +2139,7 @@
           <a:p>
             <a:fld id="{4807C888-88DA-4FA3-B018-2B6678809864}" type="datetimeFigureOut">
               <a:rPr lang="en-US" smtClean="0"/>
-              <a:t>6/6/2024</a:t>
+              <a:t>6/19/2024</a:t>
             </a:fld>
             <a:endParaRPr lang="en-US"/>
           </a:p>
@@ -2418,7 +2450,7 @@
           <a:p>
             <a:fld id="{4807C888-88DA-4FA3-B018-2B6678809864}" type="datetimeFigureOut">
               <a:rPr lang="en-US" smtClean="0"/>
-              <a:t>6/6/2024</a:t>
+              <a:t>6/19/2024</a:t>
             </a:fld>
             <a:endParaRPr lang="en-US"/>
           </a:p>
@@ -2706,7 +2738,7 @@
           <a:p>
             <a:fld id="{4807C888-88DA-4FA3-B018-2B6678809864}" type="datetimeFigureOut">
               <a:rPr lang="en-US" smtClean="0"/>
-              <a:t>6/6/2024</a:t>
+              <a:t>6/19/2024</a:t>
             </a:fld>
             <a:endParaRPr lang="en-US"/>
           </a:p>
@@ -2947,7 +2979,7 @@
           <a:p>
             <a:fld id="{4807C888-88DA-4FA3-B018-2B6678809864}" type="datetimeFigureOut">
               <a:rPr lang="en-US" smtClean="0"/>
-              <a:t>6/6/2024</a:t>
+              <a:t>6/19/2024</a:t>
             </a:fld>
             <a:endParaRPr lang="en-US"/>
           </a:p>
@@ -3763,6 +3795,66 @@
     <p:extLst>
       <p:ext uri="{BB962C8B-B14F-4D97-AF65-F5344CB8AC3E}">
         <p14:creationId xmlns:p14="http://schemas.microsoft.com/office/powerpoint/2010/main" val="1725937978"/>
+      </p:ext>
+    </p:extLst>
+  </p:cSld>
+  <p:clrMapOvr>
+    <a:masterClrMapping/>
+  </p:clrMapOvr>
+</p:sld>
+</file>
+
+<file path=ppt/slides/slide3.xml><?xml version="1.0" encoding="utf-8"?>
+<p:sld xmlns:a="http://schemas.openxmlformats.org/drawingml/2006/main" xmlns:r="http://schemas.openxmlformats.org/officeDocument/2006/relationships" xmlns:p="http://schemas.openxmlformats.org/presentationml/2006/main">
+  <p:cSld>
+    <p:spTree>
+      <p:nvGrpSpPr>
+        <p:cNvPr id="1" name=""/>
+        <p:cNvGrpSpPr/>
+        <p:nvPr/>
+      </p:nvGrpSpPr>
+      <p:grpSpPr>
+        <a:xfrm>
+          <a:off x="0" y="0"/>
+          <a:ext cx="0" cy="0"/>
+          <a:chOff x="0" y="0"/>
+          <a:chExt cx="0" cy="0"/>
+        </a:xfrm>
+      </p:grpSpPr>
+      <p:pic>
+        <p:nvPicPr>
+          <p:cNvPr id="5" name="Picture 4">
+            <a:extLst>
+              <a:ext uri="{FF2B5EF4-FFF2-40B4-BE49-F238E27FC236}">
+                <a16:creationId xmlns:a16="http://schemas.microsoft.com/office/drawing/2014/main" id="{2AA5377A-44DD-7A36-9B51-5791A865F017}"/>
+              </a:ext>
+            </a:extLst>
+          </p:cNvPr>
+          <p:cNvPicPr>
+            <a:picLocks noChangeAspect="1"/>
+          </p:cNvPicPr>
+          <p:nvPr/>
+        </p:nvPicPr>
+        <p:blipFill>
+          <a:blip r:embed="rId2"/>
+          <a:stretch>
+            <a:fillRect/>
+          </a:stretch>
+        </p:blipFill>
+        <p:spPr>
+          <a:xfrm>
+            <a:off x="2333100" y="1176023"/>
+            <a:ext cx="7525800" cy="4505954"/>
+          </a:xfrm>
+          <a:prstGeom prst="rect">
+            <a:avLst/>
+          </a:prstGeom>
+        </p:spPr>
+      </p:pic>
+    </p:spTree>
+    <p:extLst>
+      <p:ext uri="{BB962C8B-B14F-4D97-AF65-F5344CB8AC3E}">
+        <p14:creationId xmlns:p14="http://schemas.microsoft.com/office/powerpoint/2010/main" val="3971728867"/>
       </p:ext>
     </p:extLst>
   </p:cSld>

</xml_diff>